<commit_message>
Highlighted previous review comments on outline page.
</commit_message>
<xml_diff>
--- a/2015_DOE_Review/SuperBigBite DAQ update.pptx
+++ b/2015_DOE_Review/SuperBigBite DAQ update.pptx
@@ -14269,19 +14269,61 @@
           </a:xfrm>
         </p:spPr>
         <p:txBody>
-          <a:bodyPr/>
+          <a:bodyPr>
+            <a:normAutofit fontScale="92500" lnSpcReduction="10000"/>
+          </a:bodyPr>
           <a:lstStyle/>
           <a:p>
             <a:r>
               <a:rPr lang="en-US" dirty="0" smtClean="0"/>
-              <a:t>SBS requirements</a:t>
-            </a:r>
-          </a:p>
-          <a:p>
+              <a:t>SBS </a:t>
+            </a:r>
             <a:r>
               <a:rPr lang="en-US" dirty="0" smtClean="0"/>
-              <a:t>Fastbus Readout</a:t>
-            </a:r>
+              <a:t>requirements</a:t>
+            </a:r>
+          </a:p>
+          <a:p>
+            <a:pPr lvl="1"/>
+            <a:r>
+              <a:rPr lang="en-US" i="1" dirty="0" smtClean="0">
+                <a:solidFill>
+                  <a:srgbClr val="FF0000"/>
+                </a:solidFill>
+              </a:rPr>
+              <a:t>Data Event Flow</a:t>
+            </a:r>
+            <a:endParaRPr lang="en-US" i="1" dirty="0" smtClean="0">
+              <a:solidFill>
+                <a:srgbClr val="FF0000"/>
+              </a:solidFill>
+            </a:endParaRPr>
+          </a:p>
+          <a:p>
+            <a:r>
+              <a:rPr lang="en-US" dirty="0" err="1" smtClean="0"/>
+              <a:t>Fastbus</a:t>
+            </a:r>
+            <a:r>
+              <a:rPr lang="en-US" dirty="0" smtClean="0"/>
+              <a:t> Readout</a:t>
+            </a:r>
+          </a:p>
+          <a:p>
+            <a:pPr lvl="1"/>
+            <a:r>
+              <a:rPr lang="en-US" i="1" dirty="0" smtClean="0">
+                <a:solidFill>
+                  <a:srgbClr val="FF0000"/>
+                </a:solidFill>
+              </a:rPr>
+              <a:t>Event Switching</a:t>
+            </a:r>
+            <a:endParaRPr lang="en-US" i="1" dirty="0" smtClean="0">
+              <a:solidFill>
+                <a:srgbClr val="FF0000"/>
+              </a:solidFill>
+            </a:endParaRPr>
           </a:p>
           <a:p>
             <a:r>
@@ -18884,8 +18926,8 @@
         </p:blipFill>
         <p:spPr bwMode="auto">
           <a:xfrm>
-            <a:off x="97200" y="840058"/>
-            <a:ext cx="8948160" cy="5406179"/>
+            <a:off x="186520" y="944540"/>
+            <a:ext cx="8652680" cy="5227660"/>
           </a:xfrm>
           <a:prstGeom prst="rect">
             <a:avLst/>
@@ -19140,89 +19182,13 @@
       </p:cxnSp>
       <p:sp>
         <p:nvSpPr>
-          <p:cNvPr id="21" name="TextBox 20"/>
-          <p:cNvSpPr txBox="1"/>
-          <p:nvPr/>
-        </p:nvSpPr>
-        <p:spPr>
-          <a:xfrm>
-            <a:off x="4781758" y="3298351"/>
-            <a:ext cx="382312" cy="360755"/>
-          </a:xfrm>
-          <a:prstGeom prst="rect">
-            <a:avLst/>
-          </a:prstGeom>
-          <a:noFill/>
-        </p:spPr>
-        <p:txBody>
-          <a:bodyPr wrap="none" lIns="82945" tIns="41473" rIns="82945" bIns="41473" rtlCol="0">
-            <a:spAutoFit/>
-          </a:bodyPr>
-          <a:lstStyle/>
-          <a:p>
-            <a:r>
-              <a:rPr lang="en-US" dirty="0" smtClean="0">
-                <a:solidFill>
-                  <a:schemeClr val="accent1"/>
-                </a:solidFill>
-              </a:rPr>
-              <a:t>L2</a:t>
-            </a:r>
-            <a:endParaRPr lang="en-US" dirty="0">
-              <a:solidFill>
-                <a:schemeClr val="accent1"/>
-              </a:solidFill>
-            </a:endParaRPr>
-          </a:p>
-        </p:txBody>
-      </p:sp>
-      <p:sp>
-        <p:nvSpPr>
           <p:cNvPr id="26" name="TextBox 25"/>
           <p:cNvSpPr txBox="1"/>
           <p:nvPr/>
         </p:nvSpPr>
         <p:spPr>
           <a:xfrm>
-            <a:off x="5628380" y="4957253"/>
-            <a:ext cx="382312" cy="360755"/>
-          </a:xfrm>
-          <a:prstGeom prst="rect">
-            <a:avLst/>
-          </a:prstGeom>
-          <a:noFill/>
-        </p:spPr>
-        <p:txBody>
-          <a:bodyPr wrap="none" lIns="82945" tIns="41473" rIns="82945" bIns="41473" rtlCol="0">
-            <a:spAutoFit/>
-          </a:bodyPr>
-          <a:lstStyle/>
-          <a:p>
-            <a:r>
-              <a:rPr lang="en-US" dirty="0" smtClean="0">
-                <a:solidFill>
-                  <a:schemeClr val="accent1"/>
-                </a:solidFill>
-              </a:rPr>
-              <a:t>L2</a:t>
-            </a:r>
-            <a:endParaRPr lang="en-US" dirty="0">
-              <a:solidFill>
-                <a:schemeClr val="accent1"/>
-              </a:solidFill>
-            </a:endParaRPr>
-          </a:p>
-        </p:txBody>
-      </p:sp>
-      <p:sp>
-        <p:nvSpPr>
-          <p:cNvPr id="27" name="TextBox 26"/>
-          <p:cNvSpPr txBox="1"/>
-          <p:nvPr/>
-        </p:nvSpPr>
-        <p:spPr>
-          <a:xfrm>
-            <a:off x="5266028" y="2947517"/>
+            <a:off x="4724400" y="2992045"/>
             <a:ext cx="382312" cy="360755"/>
           </a:xfrm>
           <a:prstGeom prst="rect">

</xml_diff>

<commit_message>
Pushed Alex's updated slides to main.
</commit_message>
<xml_diff>
--- a/2015_DOE_Review/SuperBigBite DAQ update.pptx
+++ b/2015_DOE_Review/SuperBigBite DAQ update.pptx
@@ -127,7 +127,7 @@
   </p:defaultTextStyle>
   <p:extLst>
     <p:ext uri="{EFAFB233-063F-42B5-8137-9DF3F51BA10A}">
-      <p15:sldGuideLst xmlns:p15="http://schemas.microsoft.com/office/powerpoint/2012/main" xmlns="">
+      <p15:sldGuideLst xmlns="" xmlns:p15="http://schemas.microsoft.com/office/powerpoint/2012/main">
         <p15:guide id="1" orient="horz" pos="2160">
           <p15:clr>
             <a:srgbClr val="A4A3A4"/>
@@ -13158,13 +13158,8 @@
           <a:p>
             <a:r>
               <a:rPr lang="en-US" sz="2400" dirty="0" smtClean="0"/>
-              <a:t>Maybe issue with APV </a:t>
-            </a:r>
-            <a:r>
-              <a:rPr lang="en-US" sz="2400" dirty="0" smtClean="0"/>
-              <a:t>configuration and/or power supply.</a:t>
-            </a:r>
-            <a:endParaRPr lang="en-US" sz="2400" dirty="0" smtClean="0"/>
+              <a:t>Maybe issue with APV configuration and/or power supply.</a:t>
+            </a:r>
           </a:p>
           <a:p>
             <a:pPr lvl="1"/>
@@ -13512,28 +13507,28 @@
                 <a:gridCol w="2286000">
                   <a:extLst>
                     <a:ext uri="{9D8B030D-6E8A-4147-A177-3AD203B41FA5}">
-                      <a16:colId xmlns:a16="http://schemas.microsoft.com/office/drawing/2014/main" xmlns="" val="2383147881"/>
+                      <a16:colId xmlns="" xmlns:a16="http://schemas.microsoft.com/office/drawing/2014/main" val="2383147881"/>
                     </a:ext>
                   </a:extLst>
                 </a:gridCol>
                 <a:gridCol w="2209800">
                   <a:extLst>
                     <a:ext uri="{9D8B030D-6E8A-4147-A177-3AD203B41FA5}">
-                      <a16:colId xmlns:a16="http://schemas.microsoft.com/office/drawing/2014/main" xmlns="" val="3539225061"/>
+                      <a16:colId xmlns="" xmlns:a16="http://schemas.microsoft.com/office/drawing/2014/main" val="3539225061"/>
                     </a:ext>
                   </a:extLst>
                 </a:gridCol>
                 <a:gridCol w="2209800">
                   <a:extLst>
                     <a:ext uri="{9D8B030D-6E8A-4147-A177-3AD203B41FA5}">
-                      <a16:colId xmlns:a16="http://schemas.microsoft.com/office/drawing/2014/main" xmlns="" val="449586720"/>
+                      <a16:colId xmlns="" xmlns:a16="http://schemas.microsoft.com/office/drawing/2014/main" val="449586720"/>
                     </a:ext>
                   </a:extLst>
                 </a:gridCol>
                 <a:gridCol w="2057400">
                   <a:extLst>
                     <a:ext uri="{9D8B030D-6E8A-4147-A177-3AD203B41FA5}">
-                      <a16:colId xmlns:a16="http://schemas.microsoft.com/office/drawing/2014/main" xmlns="" val="3861353694"/>
+                      <a16:colId xmlns="" xmlns:a16="http://schemas.microsoft.com/office/drawing/2014/main" val="3861353694"/>
                     </a:ext>
                   </a:extLst>
                 </a:gridCol>
@@ -13645,7 +13640,7 @@
                 </a:tc>
                 <a:extLst>
                   <a:ext uri="{0D108BD9-81ED-4DB2-BD59-A6C34878D82A}">
-                    <a16:rowId xmlns:a16="http://schemas.microsoft.com/office/drawing/2014/main" xmlns="" val="660863743"/>
+                    <a16:rowId xmlns="" xmlns:a16="http://schemas.microsoft.com/office/drawing/2014/main" val="660863743"/>
                   </a:ext>
                 </a:extLst>
               </a:tr>
@@ -14105,7 +14100,7 @@
                 </a:tc>
                 <a:extLst>
                   <a:ext uri="{0D108BD9-81ED-4DB2-BD59-A6C34878D82A}">
-                    <a16:rowId xmlns:a16="http://schemas.microsoft.com/office/drawing/2014/main" xmlns="" val="85563496"/>
+                    <a16:rowId xmlns="" xmlns:a16="http://schemas.microsoft.com/office/drawing/2014/main" val="85563496"/>
                   </a:ext>
                 </a:extLst>
               </a:tr>
@@ -14276,11 +14271,7 @@
           <a:p>
             <a:r>
               <a:rPr lang="en-US" dirty="0" smtClean="0"/>
-              <a:t>SBS </a:t>
-            </a:r>
-            <a:r>
-              <a:rPr lang="en-US" dirty="0" smtClean="0"/>
-              <a:t>requirements</a:t>
+              <a:t>SBS requirements</a:t>
             </a:r>
           </a:p>
           <a:p>
@@ -14293,11 +14284,6 @@
               </a:rPr>
               <a:t>Data Event Flow</a:t>
             </a:r>
-            <a:endParaRPr lang="en-US" i="1" dirty="0" smtClean="0">
-              <a:solidFill>
-                <a:srgbClr val="FF0000"/>
-              </a:solidFill>
-            </a:endParaRPr>
           </a:p>
           <a:p>
             <a:r>
@@ -14319,11 +14305,6 @@
               </a:rPr>
               <a:t>Event Switching</a:t>
             </a:r>
-            <a:endParaRPr lang="en-US" i="1" dirty="0" smtClean="0">
-              <a:solidFill>
-                <a:srgbClr val="FF0000"/>
-              </a:solidFill>
-            </a:endParaRPr>
           </a:p>
           <a:p>
             <a:r>
@@ -14830,7 +14811,6 @@
               <a:rPr lang="en-US" dirty="0" smtClean="0"/>
               <a:t> event flipping works well</a:t>
             </a:r>
-            <a:endParaRPr lang="en-US" dirty="0" smtClean="0"/>
           </a:p>
           <a:p>
             <a:pPr lvl="1"/>
@@ -15007,8 +14987,8 @@
           <a:chExt cx="0" cy="0"/>
         </a:xfrm>
       </p:grpSpPr>
-      <mc:AlternateContent xmlns:mc="http://schemas.openxmlformats.org/markup-compatibility/2006">
-        <mc:Choice xmlns:a14="http://schemas.microsoft.com/office/drawing/2010/main" Requires="a14">
+      <mc:AlternateContent xmlns:mc="http://schemas.openxmlformats.org/markup-compatibility/2006" xmlns:a14="http://schemas.microsoft.com/office/drawing/2010/main">
+        <mc:Choice Requires="a14">
           <p:sp>
             <p:nvSpPr>
               <p:cNvPr id="2" name="Title 1"/>
@@ -15069,18 +15049,14 @@
                 </a14:m>
                 <a:r>
                   <a:rPr lang="en-US" dirty="0" smtClean="0"/>
-                  <a:t>- 5 DAQ </a:t>
-                </a:r>
-                <a:r>
-                  <a:rPr lang="en-US" dirty="0" smtClean="0"/>
-                  <a:t>requirements</a:t>
+                  <a:t>- 5 DAQ requirements</a:t>
                 </a:r>
                 <a:endParaRPr lang="en-US" dirty="0"/>
               </a:p>
             </p:txBody>
           </p:sp>
         </mc:Choice>
-        <mc:Fallback>
+        <mc:Fallback xmlns="">
           <p:sp>
             <p:nvSpPr>
               <p:cNvPr id="2" name="Title 1"/>
@@ -15363,12 +15339,13 @@
                 </a14:m>
                 <a:r>
                   <a:rPr lang="en-US" sz="3600" dirty="0"/>
-                  <a:t>- 5 </a:t>
+                  <a:t>- 5 event size </a:t>
                 </a:r>
                 <a:r>
-                  <a:rPr lang="en-US" sz="3600" dirty="0"/>
-                  <a:t>event size ( after deconvolution)</a:t>
+                  <a:rPr lang="en-US" sz="3600" dirty="0" smtClean="0"/>
+                  <a:t>(after deconvolution)</a:t>
                 </a:r>
+                <a:endParaRPr lang="en-US" sz="3600" dirty="0"/>
               </a:p>
             </p:txBody>
           </p:sp>
@@ -15388,7 +15365,7 @@
               <a:blipFill rotWithShape="1">
                 <a:blip r:embed="rId2"/>
                 <a:stretch>
-                  <a:fillRect t="-53846" r="-370" b="-89231"/>
+                  <a:fillRect t="-53846" b="-89231"/>
                 </a:stretch>
               </a:blipFill>
             </p:spPr>
@@ -15409,7 +15386,7 @@
       </mc:AlternateContent>
       <p:graphicFrame>
         <p:nvGraphicFramePr>
-          <p:cNvPr id="4" name="Content Placeholder 3"/>
+          <p:cNvPr id="9" name="Content Placeholder 3"/>
           <p:cNvGraphicFramePr>
             <a:graphicFrameLocks noGrp="1"/>
           </p:cNvGraphicFramePr>
@@ -15417,13 +15394,13 @@
             <p:ph idx="1"/>
             <p:extLst>
               <p:ext uri="{D42A27DB-BD31-4B8C-83A1-F6EECF244321}">
-                <p14:modId xmlns:p14="http://schemas.microsoft.com/office/powerpoint/2010/main" val="1642312224"/>
+                <p14:modId xmlns:p14="http://schemas.microsoft.com/office/powerpoint/2010/main" val="2892898936"/>
               </p:ext>
             </p:extLst>
           </p:nvPr>
         </p:nvGraphicFramePr>
         <p:xfrm>
-          <a:off x="228601" y="990600"/>
+          <a:off x="228601" y="914400"/>
           <a:ext cx="8762999" cy="4622260"/>
         </p:xfrm>
         <a:graphic>
@@ -15645,7 +15622,7 @@
                       <a:pPr algn="ctr"/>
                       <a:r>
                         <a:rPr lang="en-US" dirty="0" smtClean="0"/>
-                        <a:t>30.2</a:t>
+                        <a:t>18.1</a:t>
                       </a:r>
                       <a:endParaRPr lang="en-US" dirty="0"/>
                     </a:p>
@@ -15660,7 +15637,7 @@
                       <a:pPr algn="ctr"/>
                       <a:r>
                         <a:rPr lang="en-US" dirty="0" smtClean="0"/>
-                        <a:t>6600</a:t>
+                        <a:t>7430</a:t>
                       </a:r>
                       <a:endParaRPr lang="en-US" dirty="0"/>
                     </a:p>
@@ -15675,7 +15652,7 @@
                       <a:pPr algn="ctr"/>
                       <a:r>
                         <a:rPr lang="en-US" dirty="0" smtClean="0"/>
-                        <a:t>79,200</a:t>
+                        <a:t>136,000</a:t>
                       </a:r>
                       <a:endParaRPr lang="en-US" dirty="0"/>
                     </a:p>
@@ -15690,7 +15667,7 @@
                       <a:pPr algn="ctr"/>
                       <a:r>
                         <a:rPr lang="en-US" dirty="0" smtClean="0"/>
-                        <a:t>210</a:t>
+                        <a:t>90</a:t>
                       </a:r>
                       <a:endParaRPr lang="en-US" dirty="0"/>
                     </a:p>
@@ -15752,7 +15729,7 @@
                       <a:pPr algn="ctr"/>
                       <a:r>
                         <a:rPr lang="en-US" dirty="0" smtClean="0"/>
-                        <a:t>11.2</a:t>
+                        <a:t>22.4</a:t>
                       </a:r>
                       <a:endParaRPr lang="en-US" dirty="0"/>
                     </a:p>
@@ -15767,7 +15744,21 @@
                       <a:pPr algn="ctr"/>
                       <a:r>
                         <a:rPr lang="en-US" dirty="0" smtClean="0"/>
-                        <a:t>6720</a:t>
+                        <a:t>12600</a:t>
+                      </a:r>
+                    </a:p>
+                  </a:txBody>
+                  <a:tcPr anchor="ctr"/>
+                </a:tc>
+                <a:tc>
+                  <a:txBody>
+                    <a:bodyPr/>
+                    <a:lstStyle/>
+                    <a:p>
+                      <a:pPr algn="ctr"/>
+                      <a:r>
+                        <a:rPr lang="en-US" dirty="0" smtClean="0"/>
+                        <a:t>230,000</a:t>
                       </a:r>
                       <a:endParaRPr lang="en-US" dirty="0"/>
                     </a:p>
@@ -15782,22 +15773,7 @@
                       <a:pPr algn="ctr"/>
                       <a:r>
                         <a:rPr lang="en-US" dirty="0" smtClean="0"/>
-                        <a:t>80,600</a:t>
-                      </a:r>
-                      <a:endParaRPr lang="en-US" dirty="0"/>
-                    </a:p>
-                  </a:txBody>
-                  <a:tcPr anchor="ctr"/>
-                </a:tc>
-                <a:tc>
-                  <a:txBody>
-                    <a:bodyPr/>
-                    <a:lstStyle/>
-                    <a:p>
-                      <a:pPr algn="ctr"/>
-                      <a:r>
-                        <a:rPr lang="en-US" dirty="0" smtClean="0"/>
-                        <a:t>70</a:t>
+                        <a:t>150</a:t>
                       </a:r>
                       <a:endParaRPr lang="en-US" dirty="0"/>
                     </a:p>
@@ -16205,7 +16181,7 @@
                       <a:pPr algn="ctr"/>
                       <a:r>
                         <a:rPr lang="en-US" dirty="0" smtClean="0"/>
-                        <a:t>371 MB/s</a:t>
+                        <a:t>325.3 MB/s</a:t>
                       </a:r>
                       <a:endParaRPr lang="en-US" dirty="0"/>
                     </a:p>
@@ -16219,13 +16195,13 @@
       </p:graphicFrame>
       <p:sp>
         <p:nvSpPr>
-          <p:cNvPr id="5" name="TextBox 4"/>
+          <p:cNvPr id="10" name="TextBox 9"/>
           <p:cNvSpPr txBox="1"/>
           <p:nvPr/>
         </p:nvSpPr>
         <p:spPr>
           <a:xfrm>
-            <a:off x="838200" y="5791200"/>
+            <a:off x="838200" y="6031468"/>
             <a:ext cx="6916637" cy="369332"/>
           </a:xfrm>
           <a:prstGeom prst="rect">
@@ -16249,6 +16225,42 @@
               <a:rPr lang="en-US" dirty="0" smtClean="0"/>
               <a:t>HCAL and ECAL occupancies need to be evaluated : using 100 % for now</a:t>
             </a:r>
+          </a:p>
+        </p:txBody>
+      </p:sp>
+      <p:sp>
+        <p:nvSpPr>
+          <p:cNvPr id="11" name="TextBox 10"/>
+          <p:cNvSpPr txBox="1"/>
+          <p:nvPr/>
+        </p:nvSpPr>
+        <p:spPr>
+          <a:xfrm>
+            <a:off x="2770498" y="5574268"/>
+            <a:ext cx="3052054" cy="369332"/>
+          </a:xfrm>
+          <a:prstGeom prst="rect">
+            <a:avLst/>
+          </a:prstGeom>
+          <a:noFill/>
+          <a:ln>
+            <a:solidFill>
+              <a:schemeClr val="tx1"/>
+            </a:solidFill>
+          </a:ln>
+        </p:spPr>
+        <p:txBody>
+          <a:bodyPr wrap="none" rtlCol="0">
+            <a:spAutoFit/>
+          </a:bodyPr>
+          <a:lstStyle/>
+          <a:p>
+            <a:pPr algn="ctr"/>
+            <a:r>
+              <a:rPr lang="en-US" dirty="0" smtClean="0"/>
+              <a:t>Includes geometrical matching</a:t>
+            </a:r>
+            <a:endParaRPr lang="en-US" dirty="0" smtClean="0"/>
           </a:p>
         </p:txBody>
       </p:sp>
@@ -16282,8 +16294,8 @@
           <a:chExt cx="0" cy="0"/>
         </a:xfrm>
       </p:grpSpPr>
-      <mc:AlternateContent xmlns:mc="http://schemas.openxmlformats.org/markup-compatibility/2006">
-        <mc:Choice xmlns:a14="http://schemas.microsoft.com/office/drawing/2010/main" Requires="a14">
+      <mc:AlternateContent xmlns:mc="http://schemas.openxmlformats.org/markup-compatibility/2006" xmlns:a14="http://schemas.microsoft.com/office/drawing/2010/main">
+        <mc:Choice Requires="a14">
           <p:sp>
             <p:nvSpPr>
               <p:cNvPr id="2" name="Title 1"/>
@@ -16399,7 +16411,7 @@
             </p:txBody>
           </p:sp>
         </mc:Choice>
-        <mc:Fallback>
+        <mc:Fallback xmlns="">
           <p:sp>
             <p:nvSpPr>
               <p:cNvPr id="2" name="Title 1"/>
@@ -16669,9 +16681,16 @@
                 </a14:m>
                 <a:r>
                   <a:rPr lang="en-US" sz="3200" dirty="0"/>
-                  <a:t> event size ( after deconvolution)</a:t>
+                  <a:t> event size </a:t>
                 </a:r>
-                <a:endParaRPr lang="en-US" sz="3200" dirty="0"/>
+                <a:r>
+                  <a:rPr lang="en-US" sz="3200" dirty="0" smtClean="0"/>
+                  <a:t>(after </a:t>
+                </a:r>
+                <a:r>
+                  <a:rPr lang="en-US" sz="3200" dirty="0"/>
+                  <a:t>deconvolution)</a:t>
+                </a:r>
               </a:p>
             </p:txBody>
           </p:sp>
@@ -16712,7 +16731,7 @@
       </mc:AlternateContent>
       <p:graphicFrame>
         <p:nvGraphicFramePr>
-          <p:cNvPr id="4" name="Content Placeholder 3"/>
+          <p:cNvPr id="6" name="Content Placeholder 3"/>
           <p:cNvGraphicFramePr>
             <a:graphicFrameLocks noGrp="1"/>
           </p:cNvGraphicFramePr>
@@ -16720,13 +16739,13 @@
             <p:ph idx="1"/>
             <p:extLst>
               <p:ext uri="{D42A27DB-BD31-4B8C-83A1-F6EECF244321}">
-                <p14:modId xmlns:p14="http://schemas.microsoft.com/office/powerpoint/2010/main" val="3208355475"/>
+                <p14:modId xmlns:p14="http://schemas.microsoft.com/office/powerpoint/2010/main" val="1957474647"/>
               </p:ext>
             </p:extLst>
           </p:nvPr>
         </p:nvGraphicFramePr>
         <p:xfrm>
-          <a:off x="228600" y="866633"/>
+          <a:off x="228600" y="914400"/>
           <a:ext cx="8762999" cy="5039866"/>
         </p:xfrm>
         <a:graphic>
@@ -16987,7 +17006,7 @@
                       <a:pPr algn="ctr"/>
                       <a:r>
                         <a:rPr lang="en-US" dirty="0" smtClean="0"/>
-                        <a:t>4.6</a:t>
+                        <a:t>8.7</a:t>
                       </a:r>
                       <a:endParaRPr lang="en-US" dirty="0"/>
                     </a:p>
@@ -17032,7 +17051,7 @@
                       <a:pPr algn="ctr"/>
                       <a:r>
                         <a:rPr lang="en-US" dirty="0" smtClean="0"/>
-                        <a:t>660</a:t>
+                        <a:t>300</a:t>
                       </a:r>
                       <a:endParaRPr lang="en-US" dirty="0"/>
                     </a:p>
@@ -17758,14 +17777,14 @@
       </p:graphicFrame>
       <p:sp>
         <p:nvSpPr>
-          <p:cNvPr id="5" name="TextBox 4"/>
+          <p:cNvPr id="7" name="TextBox 6"/>
           <p:cNvSpPr txBox="1"/>
           <p:nvPr/>
         </p:nvSpPr>
         <p:spPr>
           <a:xfrm>
-            <a:off x="6705600" y="5943600"/>
-            <a:ext cx="2209800" cy="381000"/>
+            <a:off x="5181600" y="6019800"/>
+            <a:ext cx="3733800" cy="369332"/>
           </a:xfrm>
           <a:prstGeom prst="rect">
             <a:avLst/>
@@ -17786,7 +17805,23 @@
             <a:pPr algn="ctr"/>
             <a:r>
               <a:rPr lang="en-US" b="1" dirty="0" smtClean="0"/>
-              <a:t>Total  180.59 MB/s</a:t>
+              <a:t>Total </a:t>
+            </a:r>
+            <a:r>
+              <a:rPr lang="en-US" b="1" dirty="0" smtClean="0"/>
+              <a:t>at </a:t>
+            </a:r>
+            <a:r>
+              <a:rPr lang="en-US" b="1" dirty="0" smtClean="0"/>
+              <a:t>5 KHz </a:t>
+            </a:r>
+            <a:r>
+              <a:rPr lang="en-US" b="1" dirty="0" smtClean="0"/>
+              <a:t>370 </a:t>
+            </a:r>
+            <a:r>
+              <a:rPr lang="en-US" b="1" dirty="0" smtClean="0"/>
+              <a:t>MB/s Max</a:t>
             </a:r>
           </a:p>
         </p:txBody>
@@ -19091,13 +19126,8 @@
           <a:p>
             <a:r>
               <a:rPr lang="it-IT" dirty="0" smtClean="0"/>
-              <a:t>T2 distributed to Hadron and Electron </a:t>
-            </a:r>
-            <a:r>
-              <a:rPr lang="it-IT" dirty="0" smtClean="0"/>
-              <a:t>Arms</a:t>
-            </a:r>
-            <a:endParaRPr lang="it-IT" dirty="0" smtClean="0"/>
+              <a:t>T2 distributed to Hadron and Electron Arms</a:t>
+            </a:r>
           </a:p>
         </p:txBody>
       </p:sp>
@@ -19362,7 +19392,6 @@
               <a:rPr lang="it-IT" dirty="0"/>
               <a:t>If no L2A, Fast Clear to Fastbus</a:t>
             </a:r>
-            <a:endParaRPr lang="it-IT" dirty="0"/>
           </a:p>
         </p:txBody>
       </p:sp>

</xml_diff>

<commit_message>
Fix typos before 2nd dry run.
</commit_message>
<xml_diff>
--- a/2015_DOE_Review/SuperBigBite DAQ update.pptx
+++ b/2015_DOE_Review/SuperBigBite DAQ update.pptx
@@ -126,7 +126,7 @@
   </p:defaultTextStyle>
   <p:extLst>
     <p:ext uri="{EFAFB233-063F-42B5-8137-9DF3F51BA10A}">
-      <p15:sldGuideLst xmlns="" xmlns:p15="http://schemas.microsoft.com/office/powerpoint/2012/main">
+      <p15:sldGuideLst xmlns:p15="http://schemas.microsoft.com/office/powerpoint/2012/main" xmlns="">
         <p15:guide id="1" orient="horz" pos="2160">
           <p15:clr>
             <a:srgbClr val="A4A3A4"/>
@@ -324,7 +324,7 @@
           <a:p>
             <a:fld id="{B41FAE2C-98F2-4AEB-9028-7681F5825C1E}" type="datetimeFigureOut">
               <a:rPr lang="en-US" smtClean="0"/>
-              <a:t>11/11/2015</a:t>
+              <a:t>11/13/2015</a:t>
             </a:fld>
             <a:endParaRPr lang="en-US"/>
           </a:p>
@@ -497,7 +497,7 @@
           <a:p>
             <a:fld id="{B41FAE2C-98F2-4AEB-9028-7681F5825C1E}" type="datetimeFigureOut">
               <a:rPr lang="en-US" smtClean="0"/>
-              <a:t>11/11/2015</a:t>
+              <a:t>11/13/2015</a:t>
             </a:fld>
             <a:endParaRPr lang="en-US"/>
           </a:p>
@@ -687,7 +687,7 @@
           <a:p>
             <a:fld id="{B41FAE2C-98F2-4AEB-9028-7681F5825C1E}" type="datetimeFigureOut">
               <a:rPr lang="en-US" smtClean="0"/>
-              <a:t>11/11/2015</a:t>
+              <a:t>11/13/2015</a:t>
             </a:fld>
             <a:endParaRPr lang="en-US"/>
           </a:p>
@@ -944,7 +944,7 @@
                 </a:solidFill>
               </a:rPr>
               <a:pPr/>
-              <a:t>11/11/2015</a:t>
+              <a:t>11/13/2015</a:t>
             </a:fld>
             <a:endParaRPr lang="en-US">
               <a:solidFill>
@@ -1152,7 +1152,7 @@
                 </a:solidFill>
               </a:rPr>
               <a:pPr/>
-              <a:t>11/11/2015</a:t>
+              <a:t>11/13/2015</a:t>
             </a:fld>
             <a:endParaRPr lang="en-US">
               <a:solidFill>
@@ -1436,7 +1436,7 @@
                 </a:solidFill>
               </a:rPr>
               <a:pPr/>
-              <a:t>11/11/2015</a:t>
+              <a:t>11/13/2015</a:t>
             </a:fld>
             <a:endParaRPr lang="en-US">
               <a:solidFill>
@@ -1762,7 +1762,7 @@
                 </a:solidFill>
               </a:rPr>
               <a:pPr/>
-              <a:t>11/11/2015</a:t>
+              <a:t>11/13/2015</a:t>
             </a:fld>
             <a:endParaRPr lang="en-US">
               <a:solidFill>
@@ -2222,7 +2222,7 @@
                 </a:solidFill>
               </a:rPr>
               <a:pPr/>
-              <a:t>11/11/2015</a:t>
+              <a:t>11/13/2015</a:t>
             </a:fld>
             <a:endParaRPr lang="en-US">
               <a:solidFill>
@@ -2378,7 +2378,7 @@
                 </a:solidFill>
               </a:rPr>
               <a:pPr/>
-              <a:t>11/11/2015</a:t>
+              <a:t>11/13/2015</a:t>
             </a:fld>
             <a:endParaRPr lang="en-US">
               <a:solidFill>
@@ -2511,7 +2511,7 @@
                 </a:solidFill>
               </a:rPr>
               <a:pPr/>
-              <a:t>11/11/2015</a:t>
+              <a:t>11/13/2015</a:t>
             </a:fld>
             <a:endParaRPr lang="en-US">
               <a:solidFill>
@@ -2826,7 +2826,7 @@
                 </a:solidFill>
               </a:rPr>
               <a:pPr/>
-              <a:t>11/11/2015</a:t>
+              <a:t>11/13/2015</a:t>
             </a:fld>
             <a:endParaRPr lang="en-US">
               <a:solidFill>
@@ -3029,7 +3029,7 @@
           <a:p>
             <a:fld id="{B41FAE2C-98F2-4AEB-9028-7681F5825C1E}" type="datetimeFigureOut">
               <a:rPr lang="en-US" smtClean="0"/>
-              <a:t>11/11/2015</a:t>
+              <a:t>11/13/2015</a:t>
             </a:fld>
             <a:endParaRPr lang="en-US"/>
           </a:p>
@@ -3294,7 +3294,7 @@
                 </a:solidFill>
               </a:rPr>
               <a:pPr/>
-              <a:t>11/11/2015</a:t>
+              <a:t>11/13/2015</a:t>
             </a:fld>
             <a:endParaRPr lang="en-US">
               <a:solidFill>
@@ -3502,7 +3502,7 @@
                 </a:solidFill>
               </a:rPr>
               <a:pPr/>
-              <a:t>11/11/2015</a:t>
+              <a:t>11/13/2015</a:t>
             </a:fld>
             <a:endParaRPr lang="en-US">
               <a:solidFill>
@@ -3720,7 +3720,7 @@
                 </a:solidFill>
               </a:rPr>
               <a:pPr/>
-              <a:t>11/11/2015</a:t>
+              <a:t>11/13/2015</a:t>
             </a:fld>
             <a:endParaRPr lang="en-US">
               <a:solidFill>
@@ -3999,7 +3999,7 @@
           <a:p>
             <a:fld id="{B41FAE2C-98F2-4AEB-9028-7681F5825C1E}" type="datetimeFigureOut">
               <a:rPr lang="en-US" smtClean="0"/>
-              <a:t>11/11/2015</a:t>
+              <a:t>11/13/2015</a:t>
             </a:fld>
             <a:endParaRPr lang="en-US"/>
           </a:p>
@@ -4290,7 +4290,7 @@
           <a:p>
             <a:fld id="{B41FAE2C-98F2-4AEB-9028-7681F5825C1E}" type="datetimeFigureOut">
               <a:rPr lang="en-US" smtClean="0"/>
-              <a:t>11/11/2015</a:t>
+              <a:t>11/13/2015</a:t>
             </a:fld>
             <a:endParaRPr lang="en-US"/>
           </a:p>
@@ -4715,7 +4715,7 @@
           <a:p>
             <a:fld id="{B41FAE2C-98F2-4AEB-9028-7681F5825C1E}" type="datetimeFigureOut">
               <a:rPr lang="en-US" smtClean="0"/>
-              <a:t>11/11/2015</a:t>
+              <a:t>11/13/2015</a:t>
             </a:fld>
             <a:endParaRPr lang="en-US"/>
           </a:p>
@@ -4843,7 +4843,7 @@
           <a:p>
             <a:fld id="{B41FAE2C-98F2-4AEB-9028-7681F5825C1E}" type="datetimeFigureOut">
               <a:rPr lang="en-US" smtClean="0"/>
-              <a:t>11/11/2015</a:t>
+              <a:t>11/13/2015</a:t>
             </a:fld>
             <a:endParaRPr lang="en-US"/>
           </a:p>
@@ -4948,7 +4948,7 @@
           <a:p>
             <a:fld id="{B41FAE2C-98F2-4AEB-9028-7681F5825C1E}" type="datetimeFigureOut">
               <a:rPr lang="en-US" smtClean="0"/>
-              <a:t>11/11/2015</a:t>
+              <a:t>11/13/2015</a:t>
             </a:fld>
             <a:endParaRPr lang="en-US"/>
           </a:p>
@@ -5235,7 +5235,7 @@
           <a:p>
             <a:fld id="{B41FAE2C-98F2-4AEB-9028-7681F5825C1E}" type="datetimeFigureOut">
               <a:rPr lang="en-US" smtClean="0"/>
-              <a:t>11/11/2015</a:t>
+              <a:t>11/13/2015</a:t>
             </a:fld>
             <a:endParaRPr lang="en-US"/>
           </a:p>
@@ -5502,7 +5502,7 @@
           <a:p>
             <a:fld id="{B41FAE2C-98F2-4AEB-9028-7681F5825C1E}" type="datetimeFigureOut">
               <a:rPr lang="en-US" smtClean="0"/>
-              <a:t>11/11/2015</a:t>
+              <a:t>11/13/2015</a:t>
             </a:fld>
             <a:endParaRPr lang="en-US"/>
           </a:p>
@@ -5730,7 +5730,7 @@
           <a:p>
             <a:fld id="{B41FAE2C-98F2-4AEB-9028-7681F5825C1E}" type="datetimeFigureOut">
               <a:rPr lang="en-US" smtClean="0"/>
-              <a:t>11/11/2015</a:t>
+              <a:t>11/13/2015</a:t>
             </a:fld>
             <a:endParaRPr lang="en-US"/>
           </a:p>
@@ -6208,7 +6208,7 @@
                 </a:solidFill>
               </a:rPr>
               <a:pPr defTabSz="457200"/>
-              <a:t>11/11/2015</a:t>
+              <a:t>11/13/2015</a:t>
             </a:fld>
             <a:endParaRPr lang="en-US" dirty="0">
               <a:solidFill>
@@ -11117,7 +11117,7 @@
           <a:p>
             <a:fld id="{B41FAE2C-98F2-4AEB-9028-7681F5825C1E}" type="datetimeFigureOut">
               <a:rPr lang="en-US" smtClean="0"/>
-              <a:t>11/11/2015</a:t>
+              <a:t>11/13/2015</a:t>
             </a:fld>
             <a:endParaRPr lang="en-US" dirty="0"/>
           </a:p>
@@ -11677,7 +11677,7 @@
           <a:p>
             <a:fld id="{B41FAE2C-98F2-4AEB-9028-7681F5825C1E}" type="datetimeFigureOut">
               <a:rPr lang="en-US" smtClean="0"/>
-              <a:t>11/11/2015</a:t>
+              <a:t>11/13/2015</a:t>
             </a:fld>
             <a:endParaRPr lang="en-US"/>
           </a:p>
@@ -11923,7 +11923,7 @@
           <a:p>
             <a:fld id="{B41FAE2C-98F2-4AEB-9028-7681F5825C1E}" type="datetimeFigureOut">
               <a:rPr lang="en-US" smtClean="0"/>
-              <a:t>11/11/2015</a:t>
+              <a:t>11/13/2015</a:t>
             </a:fld>
             <a:endParaRPr lang="en-US"/>
           </a:p>
@@ -12523,7 +12523,7 @@
           <a:p>
             <a:fld id="{B41FAE2C-98F2-4AEB-9028-7681F5825C1E}" type="datetimeFigureOut">
               <a:rPr lang="en-US" smtClean="0"/>
-              <a:t>11/11/2015</a:t>
+              <a:t>11/13/2015</a:t>
             </a:fld>
             <a:endParaRPr lang="en-US"/>
           </a:p>
@@ -12712,7 +12712,7 @@
           <a:p>
             <a:fld id="{B41FAE2C-98F2-4AEB-9028-7681F5825C1E}" type="datetimeFigureOut">
               <a:rPr lang="en-US" smtClean="0"/>
-              <a:t>11/11/2015</a:t>
+              <a:t>11/13/2015</a:t>
             </a:fld>
             <a:endParaRPr lang="en-US"/>
           </a:p>
@@ -12939,7 +12939,7 @@
           <a:p>
             <a:fld id="{B41FAE2C-98F2-4AEB-9028-7681F5825C1E}" type="datetimeFigureOut">
               <a:rPr lang="en-US" smtClean="0"/>
-              <a:t>11/11/2015</a:t>
+              <a:t>11/13/2015</a:t>
             </a:fld>
             <a:endParaRPr lang="en-US"/>
           </a:p>
@@ -13210,7 +13210,7 @@
           <a:p>
             <a:fld id="{B41FAE2C-98F2-4AEB-9028-7681F5825C1E}" type="datetimeFigureOut">
               <a:rPr lang="en-US" smtClean="0"/>
-              <a:t>11/11/2015</a:t>
+              <a:t>11/13/2015</a:t>
             </a:fld>
             <a:endParaRPr lang="en-US"/>
           </a:p>
@@ -13310,28 +13310,28 @@
                 <a:gridCol w="2286000">
                   <a:extLst>
                     <a:ext uri="{9D8B030D-6E8A-4147-A177-3AD203B41FA5}">
-                      <a16:colId xmlns="" xmlns:a16="http://schemas.microsoft.com/office/drawing/2014/main" val="2383147881"/>
+                      <a16:colId xmlns:a16="http://schemas.microsoft.com/office/drawing/2014/main" xmlns="" val="2383147881"/>
                     </a:ext>
                   </a:extLst>
                 </a:gridCol>
                 <a:gridCol w="2209800">
                   <a:extLst>
                     <a:ext uri="{9D8B030D-6E8A-4147-A177-3AD203B41FA5}">
-                      <a16:colId xmlns="" xmlns:a16="http://schemas.microsoft.com/office/drawing/2014/main" val="3539225061"/>
+                      <a16:colId xmlns:a16="http://schemas.microsoft.com/office/drawing/2014/main" xmlns="" val="3539225061"/>
                     </a:ext>
                   </a:extLst>
                 </a:gridCol>
                 <a:gridCol w="2209800">
                   <a:extLst>
                     <a:ext uri="{9D8B030D-6E8A-4147-A177-3AD203B41FA5}">
-                      <a16:colId xmlns="" xmlns:a16="http://schemas.microsoft.com/office/drawing/2014/main" val="449586720"/>
+                      <a16:colId xmlns:a16="http://schemas.microsoft.com/office/drawing/2014/main" xmlns="" val="449586720"/>
                     </a:ext>
                   </a:extLst>
                 </a:gridCol>
                 <a:gridCol w="2057400">
                   <a:extLst>
                     <a:ext uri="{9D8B030D-6E8A-4147-A177-3AD203B41FA5}">
-                      <a16:colId xmlns="" xmlns:a16="http://schemas.microsoft.com/office/drawing/2014/main" val="3861353694"/>
+                      <a16:colId xmlns:a16="http://schemas.microsoft.com/office/drawing/2014/main" xmlns="" val="3861353694"/>
                     </a:ext>
                   </a:extLst>
                 </a:gridCol>
@@ -13443,7 +13443,7 @@
                 </a:tc>
                 <a:extLst>
                   <a:ext uri="{0D108BD9-81ED-4DB2-BD59-A6C34878D82A}">
-                    <a16:rowId xmlns="" xmlns:a16="http://schemas.microsoft.com/office/drawing/2014/main" val="660863743"/>
+                    <a16:rowId xmlns:a16="http://schemas.microsoft.com/office/drawing/2014/main" xmlns="" val="660863743"/>
                   </a:ext>
                 </a:extLst>
               </a:tr>
@@ -13903,7 +13903,7 @@
                 </a:tc>
                 <a:extLst>
                   <a:ext uri="{0D108BD9-81ED-4DB2-BD59-A6C34878D82A}">
-                    <a16:rowId xmlns="" xmlns:a16="http://schemas.microsoft.com/office/drawing/2014/main" val="85563496"/>
+                    <a16:rowId xmlns:a16="http://schemas.microsoft.com/office/drawing/2014/main" xmlns="" val="85563496"/>
                   </a:ext>
                 </a:extLst>
               </a:tr>
@@ -13956,7 +13956,7 @@
           <a:p>
             <a:fld id="{B41FAE2C-98F2-4AEB-9028-7681F5825C1E}" type="datetimeFigureOut">
               <a:rPr lang="en-US" smtClean="0"/>
-              <a:t>11/11/2015</a:t>
+              <a:t>11/13/2015</a:t>
             </a:fld>
             <a:endParaRPr lang="en-US"/>
           </a:p>
@@ -14286,7 +14286,7 @@
           <a:p>
             <a:fld id="{B41FAE2C-98F2-4AEB-9028-7681F5825C1E}" type="datetimeFigureOut">
               <a:rPr lang="en-US" smtClean="0"/>
-              <a:t>11/11/2015</a:t>
+              <a:t>11/13/2015</a:t>
             </a:fld>
             <a:endParaRPr lang="en-US"/>
           </a:p>
@@ -14490,7 +14490,7 @@
           <a:p>
             <a:fld id="{B41FAE2C-98F2-4AEB-9028-7681F5825C1E}" type="datetimeFigureOut">
               <a:rPr lang="en-US" smtClean="0"/>
-              <a:t>11/11/2015</a:t>
+              <a:t>11/13/2015</a:t>
             </a:fld>
             <a:endParaRPr lang="en-US"/>
           </a:p>
@@ -14719,7 +14719,7 @@
           <a:p>
             <a:fld id="{B41FAE2C-98F2-4AEB-9028-7681F5825C1E}" type="datetimeFigureOut">
               <a:rPr lang="en-US" smtClean="0"/>
-              <a:t>11/11/2015</a:t>
+              <a:t>11/13/2015</a:t>
             </a:fld>
             <a:endParaRPr lang="en-US"/>
           </a:p>
@@ -14790,8 +14790,8 @@
           <a:chExt cx="0" cy="0"/>
         </a:xfrm>
       </p:grpSpPr>
-      <mc:AlternateContent xmlns:mc="http://schemas.openxmlformats.org/markup-compatibility/2006">
-        <mc:Choice xmlns:a14="http://schemas.microsoft.com/office/drawing/2010/main" Requires="a14">
+      <mc:AlternateContent xmlns:mc="http://schemas.openxmlformats.org/markup-compatibility/2006" xmlns:a14="http://schemas.microsoft.com/office/drawing/2010/main">
+        <mc:Choice Requires="a14">
           <p:sp>
             <p:nvSpPr>
               <p:cNvPr id="2" name="Title 1"/>
@@ -14852,18 +14852,14 @@
                 </a14:m>
                 <a:r>
                   <a:rPr lang="en-US" dirty="0" smtClean="0"/>
-                  <a:t> </a:t>
-                </a:r>
-                <a:r>
-                  <a:rPr lang="en-US" dirty="0" smtClean="0"/>
-                  <a:t>DAQ requirements</a:t>
+                  <a:t> DAQ requirements</a:t>
                 </a:r>
                 <a:endParaRPr lang="en-US" dirty="0"/>
               </a:p>
             </p:txBody>
           </p:sp>
         </mc:Choice>
-        <mc:Fallback>
+        <mc:Fallback xmlns="">
           <p:sp>
             <p:nvSpPr>
               <p:cNvPr id="2" name="Title 1"/>
@@ -14919,7 +14915,7 @@
           <a:p>
             <a:fld id="{B41FAE2C-98F2-4AEB-9028-7681F5825C1E}" type="datetimeFigureOut">
               <a:rPr lang="en-US" smtClean="0"/>
-              <a:t>11/11/2015</a:t>
+              <a:t>11/13/2015</a:t>
             </a:fld>
             <a:endParaRPr lang="en-US"/>
           </a:p>
@@ -15084,8 +15080,8 @@
           <a:chExt cx="0" cy="0"/>
         </a:xfrm>
       </p:grpSpPr>
-      <mc:AlternateContent xmlns:mc="http://schemas.openxmlformats.org/markup-compatibility/2006">
-        <mc:Choice xmlns:a14="http://schemas.microsoft.com/office/drawing/2010/main" Requires="a14">
+      <mc:AlternateContent xmlns:mc="http://schemas.openxmlformats.org/markup-compatibility/2006" xmlns:a14="http://schemas.microsoft.com/office/drawing/2010/main">
+        <mc:Choice Requires="a14">
           <p:sp>
             <p:nvSpPr>
               <p:cNvPr id="2" name="Title 1"/>
@@ -15161,7 +15157,7 @@
             </p:txBody>
           </p:sp>
         </mc:Choice>
-        <mc:Fallback>
+        <mc:Fallback xmlns="">
           <p:sp>
             <p:nvSpPr>
               <p:cNvPr id="2" name="Title 1"/>
@@ -15205,7 +15201,7 @@
             <p:ph idx="1"/>
             <p:extLst>
               <p:ext uri="{D42A27DB-BD31-4B8C-83A1-F6EECF244321}">
-                <p14:modId xmlns:p14="http://schemas.microsoft.com/office/powerpoint/2010/main" val="2892898936"/>
+                <p14:modId xmlns:p14="http://schemas.microsoft.com/office/powerpoint/2010/main" val="3601128750"/>
               </p:ext>
             </p:extLst>
           </p:nvPr>
@@ -15510,7 +15506,7 @@
                       <a:pPr algn="ctr"/>
                       <a:r>
                         <a:rPr lang="en-US" dirty="0" smtClean="0"/>
-                        <a:t>128,000</a:t>
+                        <a:t>112,640</a:t>
                       </a:r>
                       <a:endParaRPr lang="en-US" dirty="0"/>
                     </a:p>
@@ -16071,7 +16067,6 @@
               <a:rPr lang="en-US" dirty="0" smtClean="0"/>
               <a:t>Includes geometrical matching</a:t>
             </a:r>
-            <a:endParaRPr lang="en-US" dirty="0" smtClean="0"/>
           </a:p>
         </p:txBody>
       </p:sp>
@@ -16385,8 +16380,8 @@
           <a:chExt cx="0" cy="0"/>
         </a:xfrm>
       </p:grpSpPr>
-      <mc:AlternateContent xmlns:mc="http://schemas.openxmlformats.org/markup-compatibility/2006">
-        <mc:Choice xmlns:a14="http://schemas.microsoft.com/office/drawing/2010/main" Requires="a14">
+      <mc:AlternateContent xmlns:mc="http://schemas.openxmlformats.org/markup-compatibility/2006" xmlns:a14="http://schemas.microsoft.com/office/drawing/2010/main">
+        <mc:Choice Requires="a14">
           <p:sp>
             <p:nvSpPr>
               <p:cNvPr id="2" name="Title 1"/>
@@ -16506,7 +16501,7 @@
             </p:txBody>
           </p:sp>
         </mc:Choice>
-        <mc:Fallback>
+        <mc:Fallback xmlns="">
           <p:sp>
             <p:nvSpPr>
               <p:cNvPr id="2" name="Title 1"/>
@@ -16550,7 +16545,7 @@
             <p:ph idx="1"/>
             <p:extLst>
               <p:ext uri="{D42A27DB-BD31-4B8C-83A1-F6EECF244321}">
-                <p14:modId xmlns:p14="http://schemas.microsoft.com/office/powerpoint/2010/main" val="1957474647"/>
+                <p14:modId xmlns:p14="http://schemas.microsoft.com/office/powerpoint/2010/main" val="686456963"/>
               </p:ext>
             </p:extLst>
           </p:nvPr>
@@ -16662,7 +16657,11 @@
                       <a:pPr algn="ctr"/>
                       <a:r>
                         <a:rPr lang="en-US" dirty="0" smtClean="0"/>
-                        <a:t>100 ns in %</a:t>
+                        <a:t>75 </a:t>
+                      </a:r>
+                      <a:r>
+                        <a:rPr lang="en-US" dirty="0" smtClean="0"/>
+                        <a:t>ns in %</a:t>
                       </a:r>
                       <a:endParaRPr lang="en-US" dirty="0"/>
                     </a:p>
@@ -17616,23 +17615,7 @@
             <a:pPr algn="ctr"/>
             <a:r>
               <a:rPr lang="en-US" b="1" dirty="0" smtClean="0"/>
-              <a:t>Total </a:t>
-            </a:r>
-            <a:r>
-              <a:rPr lang="en-US" b="1" dirty="0" smtClean="0"/>
-              <a:t>at </a:t>
-            </a:r>
-            <a:r>
-              <a:rPr lang="en-US" b="1" dirty="0" smtClean="0"/>
-              <a:t>5 KHz </a:t>
-            </a:r>
-            <a:r>
-              <a:rPr lang="en-US" b="1" dirty="0" smtClean="0"/>
-              <a:t>370 </a:t>
-            </a:r>
-            <a:r>
-              <a:rPr lang="en-US" b="1" dirty="0" smtClean="0"/>
-              <a:t>MB/s Max</a:t>
+              <a:t>Total at 5 KHz 370 MB/s Max</a:t>
             </a:r>
           </a:p>
         </p:txBody>
@@ -17808,7 +17791,7 @@
           <a:p>
             <a:fld id="{B41FAE2C-98F2-4AEB-9028-7681F5825C1E}" type="datetimeFigureOut">
               <a:rPr lang="en-US" smtClean="0"/>
-              <a:t>11/11/2015</a:t>
+              <a:t>11/13/2015</a:t>
             </a:fld>
             <a:endParaRPr lang="en-US"/>
           </a:p>
@@ -18572,7 +18555,7 @@
           <a:p>
             <a:fld id="{B41FAE2C-98F2-4AEB-9028-7681F5825C1E}" type="datetimeFigureOut">
               <a:rPr lang="en-US" smtClean="0"/>
-              <a:t>11/11/2015</a:t>
+              <a:t>11/13/2015</a:t>
             </a:fld>
             <a:endParaRPr lang="en-US"/>
           </a:p>
@@ -19114,7 +19097,7 @@
           <a:p>
             <a:fld id="{B41FAE2C-98F2-4AEB-9028-7681F5825C1E}" type="datetimeFigureOut">
               <a:rPr lang="en-US" smtClean="0"/>
-              <a:t>11/11/2015</a:t>
+              <a:t>11/13/2015</a:t>
             </a:fld>
             <a:endParaRPr lang="en-US" dirty="0"/>
           </a:p>

</xml_diff>